<commit_message>
feat: prep powerpoint and update UI images for report docx
</commit_message>
<xml_diff>
--- a/Báo cáo/CTU_PowerPoint_Template_English.pptx
+++ b/Báo cáo/CTU_PowerPoint_Template_English.pptx
@@ -5,17 +5,15 @@
     <p:sldMasterId id="2147483648" r:id="rId1"/>
   </p:sldMasterIdLst>
   <p:sldIdLst>
-    <p:sldId id="256" r:id="rId2"/>
-    <p:sldId id="265" r:id="rId3"/>
-    <p:sldId id="257" r:id="rId4"/>
-    <p:sldId id="259" r:id="rId5"/>
-    <p:sldId id="258" r:id="rId6"/>
-    <p:sldId id="263" r:id="rId7"/>
-    <p:sldId id="269" r:id="rId8"/>
-    <p:sldId id="266" r:id="rId9"/>
-    <p:sldId id="267" r:id="rId10"/>
-    <p:sldId id="268" r:id="rId11"/>
-    <p:sldId id="261" r:id="rId12"/>
+    <p:sldId id="265" r:id="rId2"/>
+    <p:sldId id="257" r:id="rId3"/>
+    <p:sldId id="259" r:id="rId4"/>
+    <p:sldId id="258" r:id="rId5"/>
+    <p:sldId id="263" r:id="rId6"/>
+    <p:sldId id="269" r:id="rId7"/>
+    <p:sldId id="267" r:id="rId8"/>
+    <p:sldId id="268" r:id="rId9"/>
+    <p:sldId id="261" r:id="rId10"/>
   </p:sldIdLst>
   <p:sldSz cx="12192000" cy="6858000"/>
   <p:notesSz cx="6858000" cy="9144000"/>
@@ -910,7 +908,7 @@
             <a:fld id="{D86B3AB3-BDCC-41BF-8781-963E853753C3}" type="datetime1">
               <a:rPr lang="en-US" smtClean="0"/>
               <a:pPr/>
-              <a:t>7/13/2024</a:t>
+              <a:t>08-Dec-25</a:t>
             </a:fld>
             <a:endParaRPr lang="en-US"/>
           </a:p>
@@ -2183,7 +2181,7 @@
             <a:fld id="{D86B3AB3-BDCC-41BF-8781-963E853753C3}" type="datetime1">
               <a:rPr lang="en-US" smtClean="0"/>
               <a:pPr/>
-              <a:t>7/13/2024</a:t>
+              <a:t>08-Dec-25</a:t>
             </a:fld>
             <a:endParaRPr lang="en-US"/>
           </a:p>
@@ -3280,7 +3278,7 @@
             <a:fld id="{D86B3AB3-BDCC-41BF-8781-963E853753C3}" type="datetime1">
               <a:rPr lang="en-US" smtClean="0"/>
               <a:pPr/>
-              <a:t>7/13/2024</a:t>
+              <a:t>08-Dec-25</a:t>
             </a:fld>
             <a:endParaRPr lang="en-US"/>
           </a:p>
@@ -4405,7 +4403,7 @@
             <a:fld id="{D86B3AB3-BDCC-41BF-8781-963E853753C3}" type="datetime1">
               <a:rPr lang="en-US" smtClean="0"/>
               <a:pPr/>
-              <a:t>7/13/2024</a:t>
+              <a:t>08-Dec-25</a:t>
             </a:fld>
             <a:endParaRPr lang="en-US"/>
           </a:p>
@@ -5388,7 +5386,7 @@
             <a:fld id="{D86B3AB3-BDCC-41BF-8781-963E853753C3}" type="datetime1">
               <a:rPr lang="en-US" smtClean="0"/>
               <a:pPr/>
-              <a:t>7/13/2024</a:t>
+              <a:t>08-Dec-25</a:t>
             </a:fld>
             <a:endParaRPr lang="en-US"/>
           </a:p>
@@ -6371,7 +6369,7 @@
             <a:fld id="{D86B3AB3-BDCC-41BF-8781-963E853753C3}" type="datetime1">
               <a:rPr lang="en-US" smtClean="0"/>
               <a:pPr/>
-              <a:t>7/13/2024</a:t>
+              <a:t>08-Dec-25</a:t>
             </a:fld>
             <a:endParaRPr lang="en-US"/>
           </a:p>
@@ -7375,7 +7373,7 @@
             <a:fld id="{D86B3AB3-BDCC-41BF-8781-963E853753C3}" type="datetime1">
               <a:rPr lang="en-US" smtClean="0"/>
               <a:pPr/>
-              <a:t>7/13/2024</a:t>
+              <a:t>08-Dec-25</a:t>
             </a:fld>
             <a:endParaRPr lang="en-US"/>
           </a:p>
@@ -8464,7 +8462,7 @@
             <a:fld id="{D86B3AB3-BDCC-41BF-8781-963E853753C3}" type="datetime1">
               <a:rPr lang="en-US" smtClean="0"/>
               <a:pPr/>
-              <a:t>7/13/2024</a:t>
+              <a:t>08-Dec-25</a:t>
             </a:fld>
             <a:endParaRPr lang="en-US"/>
           </a:p>
@@ -9374,7 +9372,7 @@
             <a:fld id="{D86B3AB3-BDCC-41BF-8781-963E853753C3}" type="datetime1">
               <a:rPr lang="en-US" smtClean="0"/>
               <a:pPr/>
-              <a:t>7/13/2024</a:t>
+              <a:t>08-Dec-25</a:t>
             </a:fld>
             <a:endParaRPr lang="en-US"/>
           </a:p>
@@ -10821,7 +10819,7 @@
             <a:fld id="{D86B3AB3-BDCC-41BF-8781-963E853753C3}" type="datetime1">
               <a:rPr lang="en-US" smtClean="0"/>
               <a:pPr/>
-              <a:t>7/13/2024</a:t>
+              <a:t>08-Dec-25</a:t>
             </a:fld>
             <a:endParaRPr lang="en-US"/>
           </a:p>
@@ -12040,7 +12038,7 @@
             <a:fld id="{D86B3AB3-BDCC-41BF-8781-963E853753C3}" type="datetime1">
               <a:rPr lang="en-US" smtClean="0"/>
               <a:pPr/>
-              <a:t>7/13/2024</a:t>
+              <a:t>08-Dec-25</a:t>
             </a:fld>
             <a:endParaRPr lang="en-US"/>
           </a:p>
@@ -12861,7 +12859,7 @@
             <a:fld id="{D86B3AB3-BDCC-41BF-8781-963E853753C3}" type="datetime1">
               <a:rPr lang="en-US" smtClean="0"/>
               <a:pPr/>
-              <a:t>7/13/2024</a:t>
+              <a:t>08-Dec-25</a:t>
             </a:fld>
             <a:endParaRPr lang="en-US"/>
           </a:p>
@@ -14071,7 +14069,7 @@
             <a:fld id="{D86B3AB3-BDCC-41BF-8781-963E853753C3}" type="datetime1">
               <a:rPr lang="en-US" smtClean="0"/>
               <a:pPr/>
-              <a:t>7/13/2024</a:t>
+              <a:t>08-Dec-25</a:t>
             </a:fld>
             <a:endParaRPr lang="en-US"/>
           </a:p>
@@ -14915,7 +14913,7 @@
             <a:fld id="{D86B3AB3-BDCC-41BF-8781-963E853753C3}" type="datetime1">
               <a:rPr lang="en-US" smtClean="0"/>
               <a:pPr/>
-              <a:t>7/13/2024</a:t>
+              <a:t>08-Dec-25</a:t>
             </a:fld>
             <a:endParaRPr lang="en-US"/>
           </a:p>
@@ -15620,7 +15618,7 @@
             <a:fld id="{D86B3AB3-BDCC-41BF-8781-963E853753C3}" type="datetime1">
               <a:rPr lang="en-US" smtClean="0"/>
               <a:pPr/>
-              <a:t>7/13/2024</a:t>
+              <a:t>08-Dec-25</a:t>
             </a:fld>
             <a:endParaRPr lang="en-US"/>
           </a:p>
@@ -16346,7 +16344,7 @@
             <a:fld id="{D86B3AB3-BDCC-41BF-8781-963E853753C3}" type="datetime1">
               <a:rPr lang="en-US" smtClean="0"/>
               <a:pPr/>
-              <a:t>7/13/2024</a:t>
+              <a:t>08-Dec-25</a:t>
             </a:fld>
             <a:endParaRPr lang="en-US"/>
           </a:p>
@@ -17146,7 +17144,7 @@
             <a:fld id="{D86B3AB3-BDCC-41BF-8781-963E853753C3}" type="datetime1">
               <a:rPr lang="en-US" smtClean="0"/>
               <a:pPr/>
-              <a:t>7/13/2024</a:t>
+              <a:t>08-Dec-25</a:t>
             </a:fld>
             <a:endParaRPr lang="en-US"/>
           </a:p>
@@ -17949,7 +17947,7 @@
             <a:fld id="{D86B3AB3-BDCC-41BF-8781-963E853753C3}" type="datetime1">
               <a:rPr lang="en-US" smtClean="0"/>
               <a:pPr/>
-              <a:t>7/13/2024</a:t>
+              <a:t>08-Dec-25</a:t>
             </a:fld>
             <a:endParaRPr lang="en-US"/>
           </a:p>
@@ -20923,7 +20921,7 @@
             <a:fld id="{D86B3AB3-BDCC-41BF-8781-963E853753C3}" type="datetime1">
               <a:rPr lang="en-US" smtClean="0"/>
               <a:pPr/>
-              <a:t>7/13/2024</a:t>
+              <a:t>08-Dec-25</a:t>
             </a:fld>
             <a:endParaRPr lang="en-US"/>
           </a:p>
@@ -24053,7 +24051,7 @@
             <a:fld id="{D86B3AB3-BDCC-41BF-8781-963E853753C3}" type="datetime1">
               <a:rPr lang="en-US" smtClean="0"/>
               <a:pPr/>
-              <a:t>7/13/2024</a:t>
+              <a:t>08-Dec-25</a:t>
             </a:fld>
             <a:endParaRPr lang="en-US"/>
           </a:p>
@@ -25069,7 +25067,7 @@
             <a:fld id="{D86B3AB3-BDCC-41BF-8781-963E853753C3}" type="datetime1">
               <a:rPr lang="en-US" smtClean="0"/>
               <a:pPr/>
-              <a:t>7/13/2024</a:t>
+              <a:t>08-Dec-25</a:t>
             </a:fld>
             <a:endParaRPr lang="en-US"/>
           </a:p>
@@ -27171,7 +27169,7 @@
             <a:fld id="{D86B3AB3-BDCC-41BF-8781-963E853753C3}" type="datetime1">
               <a:rPr lang="en-US" smtClean="0"/>
               <a:pPr/>
-              <a:t>7/13/2024</a:t>
+              <a:t>08-Dec-25</a:t>
             </a:fld>
             <a:endParaRPr lang="en-US"/>
           </a:p>
@@ -29366,7 +29364,7 @@
             <a:fld id="{D86B3AB3-BDCC-41BF-8781-963E853753C3}" type="datetime1">
               <a:rPr lang="en-US" smtClean="0"/>
               <a:pPr/>
-              <a:t>7/13/2024</a:t>
+              <a:t>08-Dec-25</a:t>
             </a:fld>
             <a:endParaRPr lang="en-US"/>
           </a:p>
@@ -30553,7 +30551,7 @@
             <a:fld id="{D86B3AB3-BDCC-41BF-8781-963E853753C3}" type="datetime1">
               <a:rPr lang="en-US" smtClean="0"/>
               <a:pPr/>
-              <a:t>7/13/2024</a:t>
+              <a:t>08-Dec-25</a:t>
             </a:fld>
             <a:endParaRPr lang="en-US"/>
           </a:p>
@@ -31633,7 +31631,7 @@
             <a:fld id="{D86B3AB3-BDCC-41BF-8781-963E853753C3}" type="datetime1">
               <a:rPr lang="en-US" smtClean="0"/>
               <a:pPr/>
-              <a:t>7/13/2024</a:t>
+              <a:t>08-Dec-25</a:t>
             </a:fld>
             <a:endParaRPr lang="en-US"/>
           </a:p>
@@ -32590,7 +32588,7 @@
             <a:fld id="{D86B3AB3-BDCC-41BF-8781-963E853753C3}" type="datetime1">
               <a:rPr lang="en-US" smtClean="0"/>
               <a:pPr/>
-              <a:t>7/13/2024</a:t>
+              <a:t>08-Dec-25</a:t>
             </a:fld>
             <a:endParaRPr lang="en-US"/>
           </a:p>
@@ -33493,7 +33491,7 @@
             <a:fld id="{D86B3AB3-BDCC-41BF-8781-963E853753C3}" type="datetime1">
               <a:rPr lang="en-US" smtClean="0"/>
               <a:pPr/>
-              <a:t>7/13/2024</a:t>
+              <a:t>08-Dec-25</a:t>
             </a:fld>
             <a:endParaRPr lang="en-US"/>
           </a:p>
@@ -34428,7 +34426,7 @@
             <a:fld id="{D86B3AB3-BDCC-41BF-8781-963E853753C3}" type="datetime1">
               <a:rPr lang="en-US" smtClean="0"/>
               <a:pPr/>
-              <a:t>7/13/2024</a:t>
+              <a:t>08-Dec-25</a:t>
             </a:fld>
             <a:endParaRPr lang="en-US"/>
           </a:p>
@@ -35457,7 +35455,7 @@
             <a:fld id="{D86B3AB3-BDCC-41BF-8781-963E853753C3}" type="datetime1">
               <a:rPr lang="en-US" smtClean="0"/>
               <a:pPr/>
-              <a:t>7/13/2024</a:t>
+              <a:t>08-Dec-25</a:t>
             </a:fld>
             <a:endParaRPr lang="en-US"/>
           </a:p>
@@ -35848,7 +35846,7 @@
             <a:fld id="{00D1CE85-AA59-46D7-98F4-301D80B40614}" type="datetimeFigureOut">
               <a:rPr lang="en-US" smtClean="0"/>
               <a:pPr/>
-              <a:t>7/13/2024</a:t>
+              <a:t>08-Dec-25</a:t>
             </a:fld>
             <a:endParaRPr lang="en-US"/>
           </a:p>
@@ -36279,354 +36277,6 @@
           <p:cNvPr id="2" name="Title 1">
             <a:extLst>
               <a:ext uri="{FF2B5EF4-FFF2-40B4-BE49-F238E27FC236}">
-                <a16:creationId xmlns:a16="http://schemas.microsoft.com/office/drawing/2014/main" id="{88C45E41-A1AF-488B-B0BD-65F8B7FDA7DF}"/>
-              </a:ext>
-            </a:extLst>
-          </p:cNvPr>
-          <p:cNvSpPr>
-            <a:spLocks noGrp="1"/>
-          </p:cNvSpPr>
-          <p:nvPr>
-            <p:ph type="ctrTitle"/>
-          </p:nvPr>
-        </p:nvSpPr>
-        <p:spPr/>
-        <p:txBody>
-          <a:bodyPr/>
-          <a:lstStyle/>
-          <a:p>
-            <a:endParaRPr lang="en-US"/>
-          </a:p>
-        </p:txBody>
-      </p:sp>
-      <p:sp>
-        <p:nvSpPr>
-          <p:cNvPr id="3" name="Subtitle 2">
-            <a:extLst>
-              <a:ext uri="{FF2B5EF4-FFF2-40B4-BE49-F238E27FC236}">
-                <a16:creationId xmlns:a16="http://schemas.microsoft.com/office/drawing/2014/main" id="{F49537F2-C3B5-487E-AF04-318467A156F4}"/>
-              </a:ext>
-            </a:extLst>
-          </p:cNvPr>
-          <p:cNvSpPr>
-            <a:spLocks noGrp="1"/>
-          </p:cNvSpPr>
-          <p:nvPr>
-            <p:ph type="subTitle" idx="1"/>
-          </p:nvPr>
-        </p:nvSpPr>
-        <p:spPr/>
-        <p:txBody>
-          <a:bodyPr/>
-          <a:lstStyle/>
-          <a:p>
-            <a:endParaRPr lang="en-US"/>
-          </a:p>
-        </p:txBody>
-      </p:sp>
-      <p:sp>
-        <p:nvSpPr>
-          <p:cNvPr id="4" name="Text Placeholder 3">
-            <a:extLst>
-              <a:ext uri="{FF2B5EF4-FFF2-40B4-BE49-F238E27FC236}">
-                <a16:creationId xmlns:a16="http://schemas.microsoft.com/office/drawing/2014/main" id="{8727A67E-F5E5-4E62-AFA1-B5747C25AED8}"/>
-              </a:ext>
-            </a:extLst>
-          </p:cNvPr>
-          <p:cNvSpPr>
-            <a:spLocks noGrp="1"/>
-          </p:cNvSpPr>
-          <p:nvPr>
-            <p:ph type="body" sz="quarter" idx="12"/>
-          </p:nvPr>
-        </p:nvSpPr>
-        <p:spPr/>
-        <p:txBody>
-          <a:bodyPr/>
-          <a:lstStyle/>
-          <a:p>
-            <a:endParaRPr lang="en-US"/>
-          </a:p>
-        </p:txBody>
-      </p:sp>
-    </p:spTree>
-    <p:extLst>
-      <p:ext uri="{BB962C8B-B14F-4D97-AF65-F5344CB8AC3E}">
-        <p14:creationId xmlns:p14="http://schemas.microsoft.com/office/powerpoint/2010/main" val="520877064"/>
-      </p:ext>
-    </p:extLst>
-  </p:cSld>
-  <p:clrMapOvr>
-    <a:masterClrMapping/>
-  </p:clrMapOvr>
-</p:sld>
-</file>
-
-<file path=ppt/slides/slide10.xml><?xml version="1.0" encoding="utf-8"?>
-<p:sld xmlns:a="http://schemas.openxmlformats.org/drawingml/2006/main" xmlns:r="http://schemas.openxmlformats.org/officeDocument/2006/relationships" xmlns:p="http://schemas.openxmlformats.org/presentationml/2006/main">
-  <p:cSld>
-    <p:spTree>
-      <p:nvGrpSpPr>
-        <p:cNvPr id="1" name=""/>
-        <p:cNvGrpSpPr/>
-        <p:nvPr/>
-      </p:nvGrpSpPr>
-      <p:grpSpPr>
-        <a:xfrm>
-          <a:off x="0" y="0"/>
-          <a:ext cx="0" cy="0"/>
-          <a:chOff x="0" y="0"/>
-          <a:chExt cx="0" cy="0"/>
-        </a:xfrm>
-      </p:grpSpPr>
-      <p:sp>
-        <p:nvSpPr>
-          <p:cNvPr id="2" name="Subtitle 1">
-            <a:extLst>
-              <a:ext uri="{FF2B5EF4-FFF2-40B4-BE49-F238E27FC236}">
-                <a16:creationId xmlns:a16="http://schemas.microsoft.com/office/drawing/2014/main" id="{B7AECF2B-E50F-A6A6-AADE-456F742CD3AE}"/>
-              </a:ext>
-            </a:extLst>
-          </p:cNvPr>
-          <p:cNvSpPr>
-            <a:spLocks noGrp="1"/>
-          </p:cNvSpPr>
-          <p:nvPr>
-            <p:ph type="subTitle" idx="1"/>
-          </p:nvPr>
-        </p:nvSpPr>
-        <p:spPr/>
-        <p:txBody>
-          <a:bodyPr/>
-          <a:lstStyle/>
-          <a:p>
-            <a:endParaRPr lang="en-US"/>
-          </a:p>
-        </p:txBody>
-      </p:sp>
-      <p:sp>
-        <p:nvSpPr>
-          <p:cNvPr id="3" name="Title 2">
-            <a:extLst>
-              <a:ext uri="{FF2B5EF4-FFF2-40B4-BE49-F238E27FC236}">
-                <a16:creationId xmlns:a16="http://schemas.microsoft.com/office/drawing/2014/main" id="{9E1D4F71-4885-3683-64D0-64BF6D3AC7AE}"/>
-              </a:ext>
-            </a:extLst>
-          </p:cNvPr>
-          <p:cNvSpPr>
-            <a:spLocks noGrp="1"/>
-          </p:cNvSpPr>
-          <p:nvPr>
-            <p:ph type="ctrTitle"/>
-          </p:nvPr>
-        </p:nvSpPr>
-        <p:spPr/>
-        <p:txBody>
-          <a:bodyPr/>
-          <a:lstStyle/>
-          <a:p>
-            <a:endParaRPr lang="en-US"/>
-          </a:p>
-        </p:txBody>
-      </p:sp>
-      <p:sp>
-        <p:nvSpPr>
-          <p:cNvPr id="4" name="Picture Placeholder 3">
-            <a:extLst>
-              <a:ext uri="{FF2B5EF4-FFF2-40B4-BE49-F238E27FC236}">
-                <a16:creationId xmlns:a16="http://schemas.microsoft.com/office/drawing/2014/main" id="{181CF957-9717-CF9C-DDCE-73E2B84B196B}"/>
-              </a:ext>
-            </a:extLst>
-          </p:cNvPr>
-          <p:cNvSpPr>
-            <a:spLocks noGrp="1"/>
-          </p:cNvSpPr>
-          <p:nvPr>
-            <p:ph type="pic" sz="quarter" idx="13"/>
-          </p:nvPr>
-        </p:nvSpPr>
-        <p:spPr/>
-        <p:txBody>
-          <a:bodyPr/>
-          <a:lstStyle/>
-          <a:p>
-            <a:endParaRPr lang="en-US"/>
-          </a:p>
-        </p:txBody>
-      </p:sp>
-      <p:sp>
-        <p:nvSpPr>
-          <p:cNvPr id="5" name="Picture Placeholder 4">
-            <a:extLst>
-              <a:ext uri="{FF2B5EF4-FFF2-40B4-BE49-F238E27FC236}">
-                <a16:creationId xmlns:a16="http://schemas.microsoft.com/office/drawing/2014/main" id="{2B01A400-0FCB-318B-954F-77575B0F60DD}"/>
-              </a:ext>
-            </a:extLst>
-          </p:cNvPr>
-          <p:cNvSpPr>
-            <a:spLocks noGrp="1"/>
-          </p:cNvSpPr>
-          <p:nvPr>
-            <p:ph type="pic" sz="quarter" idx="12"/>
-          </p:nvPr>
-        </p:nvSpPr>
-        <p:spPr/>
-        <p:txBody>
-          <a:bodyPr/>
-          <a:lstStyle/>
-          <a:p>
-            <a:endParaRPr lang="en-US"/>
-          </a:p>
-        </p:txBody>
-      </p:sp>
-      <p:sp>
-        <p:nvSpPr>
-          <p:cNvPr id="6" name="Picture Placeholder 5">
-            <a:extLst>
-              <a:ext uri="{FF2B5EF4-FFF2-40B4-BE49-F238E27FC236}">
-                <a16:creationId xmlns:a16="http://schemas.microsoft.com/office/drawing/2014/main" id="{2EEB064E-27A5-9F9D-B86F-3633B918516A}"/>
-              </a:ext>
-            </a:extLst>
-          </p:cNvPr>
-          <p:cNvSpPr>
-            <a:spLocks noGrp="1"/>
-          </p:cNvSpPr>
-          <p:nvPr>
-            <p:ph type="pic" sz="quarter" idx="14"/>
-          </p:nvPr>
-        </p:nvSpPr>
-        <p:spPr/>
-        <p:txBody>
-          <a:bodyPr/>
-          <a:lstStyle/>
-          <a:p>
-            <a:endParaRPr lang="en-US"/>
-          </a:p>
-        </p:txBody>
-      </p:sp>
-    </p:spTree>
-    <p:extLst>
-      <p:ext uri="{BB962C8B-B14F-4D97-AF65-F5344CB8AC3E}">
-        <p14:creationId xmlns:p14="http://schemas.microsoft.com/office/powerpoint/2010/main" val="276068639"/>
-      </p:ext>
-    </p:extLst>
-  </p:cSld>
-  <p:clrMapOvr>
-    <a:masterClrMapping/>
-  </p:clrMapOvr>
-</p:sld>
-</file>
-
-<file path=ppt/slides/slide11.xml><?xml version="1.0" encoding="utf-8"?>
-<p:sld xmlns:a="http://schemas.openxmlformats.org/drawingml/2006/main" xmlns:r="http://schemas.openxmlformats.org/officeDocument/2006/relationships" xmlns:p="http://schemas.openxmlformats.org/presentationml/2006/main">
-  <p:cSld>
-    <p:spTree>
-      <p:nvGrpSpPr>
-        <p:cNvPr id="1" name=""/>
-        <p:cNvGrpSpPr/>
-        <p:nvPr/>
-      </p:nvGrpSpPr>
-      <p:grpSpPr>
-        <a:xfrm>
-          <a:off x="0" y="0"/>
-          <a:ext cx="0" cy="0"/>
-          <a:chOff x="0" y="0"/>
-          <a:chExt cx="0" cy="0"/>
-        </a:xfrm>
-      </p:grpSpPr>
-      <p:sp>
-        <p:nvSpPr>
-          <p:cNvPr id="2" name="Title 1">
-            <a:extLst>
-              <a:ext uri="{FF2B5EF4-FFF2-40B4-BE49-F238E27FC236}">
-                <a16:creationId xmlns:a16="http://schemas.microsoft.com/office/drawing/2014/main" id="{6727981F-8DDB-4942-9095-1A301A93096A}"/>
-              </a:ext>
-            </a:extLst>
-          </p:cNvPr>
-          <p:cNvSpPr>
-            <a:spLocks noGrp="1"/>
-          </p:cNvSpPr>
-          <p:nvPr>
-            <p:ph type="ctrTitle"/>
-          </p:nvPr>
-        </p:nvSpPr>
-        <p:spPr/>
-        <p:txBody>
-          <a:bodyPr/>
-          <a:lstStyle/>
-          <a:p>
-            <a:r>
-              <a:rPr lang="vi-VN"/>
-              <a:t>THANK YOU VERY MUCH</a:t>
-            </a:r>
-            <a:endParaRPr lang="en-US"/>
-          </a:p>
-        </p:txBody>
-      </p:sp>
-      <p:sp>
-        <p:nvSpPr>
-          <p:cNvPr id="3" name="Subtitle 2">
-            <a:extLst>
-              <a:ext uri="{FF2B5EF4-FFF2-40B4-BE49-F238E27FC236}">
-                <a16:creationId xmlns:a16="http://schemas.microsoft.com/office/drawing/2014/main" id="{E3DE8CBC-CC0F-41DD-9762-03FD26D3B012}"/>
-              </a:ext>
-            </a:extLst>
-          </p:cNvPr>
-          <p:cNvSpPr>
-            <a:spLocks noGrp="1"/>
-          </p:cNvSpPr>
-          <p:nvPr>
-            <p:ph type="subTitle" idx="1"/>
-          </p:nvPr>
-        </p:nvSpPr>
-        <p:spPr/>
-        <p:txBody>
-          <a:bodyPr/>
-          <a:lstStyle/>
-          <a:p>
-            <a:r>
-              <a:rPr lang="vi-VN"/>
-              <a:t>Can Tho University</a:t>
-            </a:r>
-            <a:endParaRPr lang="en-US"/>
-          </a:p>
-        </p:txBody>
-      </p:sp>
-    </p:spTree>
-    <p:extLst>
-      <p:ext uri="{BB962C8B-B14F-4D97-AF65-F5344CB8AC3E}">
-        <p14:creationId xmlns:p14="http://schemas.microsoft.com/office/powerpoint/2010/main" val="131648227"/>
-      </p:ext>
-    </p:extLst>
-  </p:cSld>
-  <p:clrMapOvr>
-    <a:masterClrMapping/>
-  </p:clrMapOvr>
-</p:sld>
-</file>
-
-<file path=ppt/slides/slide2.xml><?xml version="1.0" encoding="utf-8"?>
-<p:sld xmlns:a="http://schemas.openxmlformats.org/drawingml/2006/main" xmlns:r="http://schemas.openxmlformats.org/officeDocument/2006/relationships" xmlns:p="http://schemas.openxmlformats.org/presentationml/2006/main">
-  <p:cSld>
-    <p:spTree>
-      <p:nvGrpSpPr>
-        <p:cNvPr id="1" name=""/>
-        <p:cNvGrpSpPr/>
-        <p:nvPr/>
-      </p:nvGrpSpPr>
-      <p:grpSpPr>
-        <a:xfrm>
-          <a:off x="0" y="0"/>
-          <a:ext cx="0" cy="0"/>
-          <a:chOff x="0" y="0"/>
-          <a:chExt cx="0" cy="0"/>
-        </a:xfrm>
-      </p:grpSpPr>
-      <p:sp>
-        <p:nvSpPr>
-          <p:cNvPr id="2" name="Title 1">
-            <a:extLst>
-              <a:ext uri="{FF2B5EF4-FFF2-40B4-BE49-F238E27FC236}">
                 <a16:creationId xmlns:a16="http://schemas.microsoft.com/office/drawing/2014/main" id="{5CB59C82-E165-4291-296C-0B6D296854DE}"/>
               </a:ext>
             </a:extLst>
@@ -36710,7 +36360,7 @@
 </p:sld>
 </file>
 
-<file path=ppt/slides/slide3.xml><?xml version="1.0" encoding="utf-8"?>
+<file path=ppt/slides/slide2.xml><?xml version="1.0" encoding="utf-8"?>
 <p:sld xmlns:a="http://schemas.openxmlformats.org/drawingml/2006/main" xmlns:r="http://schemas.openxmlformats.org/officeDocument/2006/relationships" xmlns:p="http://schemas.openxmlformats.org/presentationml/2006/main">
   <p:cSld>
     <p:spTree>
@@ -36790,7 +36440,7 @@
 </p:sld>
 </file>
 
-<file path=ppt/slides/slide4.xml><?xml version="1.0" encoding="utf-8"?>
+<file path=ppt/slides/slide3.xml><?xml version="1.0" encoding="utf-8"?>
 <p:sld xmlns:a="http://schemas.openxmlformats.org/drawingml/2006/main" xmlns:r="http://schemas.openxmlformats.org/officeDocument/2006/relationships" xmlns:p="http://schemas.openxmlformats.org/presentationml/2006/main">
   <p:cSld>
     <p:spTree>
@@ -36872,7 +36522,7 @@
 </p:sld>
 </file>
 
-<file path=ppt/slides/slide5.xml><?xml version="1.0" encoding="utf-8"?>
+<file path=ppt/slides/slide4.xml><?xml version="1.0" encoding="utf-8"?>
 <p:sld xmlns:a="http://schemas.openxmlformats.org/drawingml/2006/main" xmlns:r="http://schemas.openxmlformats.org/officeDocument/2006/relationships" xmlns:p="http://schemas.openxmlformats.org/presentationml/2006/main">
   <p:cSld>
     <p:spTree>
@@ -36952,7 +36602,7 @@
 </p:sld>
 </file>
 
-<file path=ppt/slides/slide6.xml><?xml version="1.0" encoding="utf-8"?>
+<file path=ppt/slides/slide5.xml><?xml version="1.0" encoding="utf-8"?>
 <p:sld xmlns:a="http://schemas.openxmlformats.org/drawingml/2006/main" xmlns:r="http://schemas.openxmlformats.org/officeDocument/2006/relationships" xmlns:p="http://schemas.openxmlformats.org/presentationml/2006/main">
   <p:cSld>
     <p:spTree>
@@ -37107,7 +36757,7 @@
 </p:sld>
 </file>
 
-<file path=ppt/slides/slide7.xml><?xml version="1.0" encoding="utf-8"?>
+<file path=ppt/slides/slide6.xml><?xml version="1.0" encoding="utf-8"?>
 <p:sld xmlns:a="http://schemas.openxmlformats.org/drawingml/2006/main" xmlns:r="http://schemas.openxmlformats.org/officeDocument/2006/relationships" xmlns:p="http://schemas.openxmlformats.org/presentationml/2006/main">
   <p:cSld>
     <p:spTree>
@@ -37266,112 +36916,7 @@
 </p:sld>
 </file>
 
-<file path=ppt/slides/slide8.xml><?xml version="1.0" encoding="utf-8"?>
-<p:sld xmlns:a="http://schemas.openxmlformats.org/drawingml/2006/main" xmlns:r="http://schemas.openxmlformats.org/officeDocument/2006/relationships" xmlns:p="http://schemas.openxmlformats.org/presentationml/2006/main">
-  <p:cSld>
-    <p:spTree>
-      <p:nvGrpSpPr>
-        <p:cNvPr id="1" name=""/>
-        <p:cNvGrpSpPr/>
-        <p:nvPr/>
-      </p:nvGrpSpPr>
-      <p:grpSpPr>
-        <a:xfrm>
-          <a:off x="0" y="0"/>
-          <a:ext cx="0" cy="0"/>
-          <a:chOff x="0" y="0"/>
-          <a:chExt cx="0" cy="0"/>
-        </a:xfrm>
-      </p:grpSpPr>
-      <p:sp>
-        <p:nvSpPr>
-          <p:cNvPr id="2" name="Picture Placeholder 1">
-            <a:extLst>
-              <a:ext uri="{FF2B5EF4-FFF2-40B4-BE49-F238E27FC236}">
-                <a16:creationId xmlns:a16="http://schemas.microsoft.com/office/drawing/2014/main" id="{B309368D-80CF-13C8-01DF-AC8188BD7C87}"/>
-              </a:ext>
-            </a:extLst>
-          </p:cNvPr>
-          <p:cNvSpPr>
-            <a:spLocks noGrp="1"/>
-          </p:cNvSpPr>
-          <p:nvPr>
-            <p:ph type="pic" sz="quarter" idx="12"/>
-          </p:nvPr>
-        </p:nvSpPr>
-        <p:spPr/>
-        <p:txBody>
-          <a:bodyPr/>
-          <a:lstStyle/>
-          <a:p>
-            <a:endParaRPr lang="en-US"/>
-          </a:p>
-        </p:txBody>
-      </p:sp>
-      <p:sp>
-        <p:nvSpPr>
-          <p:cNvPr id="3" name="Title 2">
-            <a:extLst>
-              <a:ext uri="{FF2B5EF4-FFF2-40B4-BE49-F238E27FC236}">
-                <a16:creationId xmlns:a16="http://schemas.microsoft.com/office/drawing/2014/main" id="{A904581F-8973-0C84-291E-542AFB439C4F}"/>
-              </a:ext>
-            </a:extLst>
-          </p:cNvPr>
-          <p:cNvSpPr>
-            <a:spLocks noGrp="1"/>
-          </p:cNvSpPr>
-          <p:nvPr>
-            <p:ph type="ctrTitle"/>
-          </p:nvPr>
-        </p:nvSpPr>
-        <p:spPr/>
-        <p:txBody>
-          <a:bodyPr/>
-          <a:lstStyle/>
-          <a:p>
-            <a:endParaRPr lang="en-US"/>
-          </a:p>
-        </p:txBody>
-      </p:sp>
-      <p:sp>
-        <p:nvSpPr>
-          <p:cNvPr id="4" name="Subtitle 3">
-            <a:extLst>
-              <a:ext uri="{FF2B5EF4-FFF2-40B4-BE49-F238E27FC236}">
-                <a16:creationId xmlns:a16="http://schemas.microsoft.com/office/drawing/2014/main" id="{064DBEAB-3C67-BC6D-B59C-AC9B97F5F3EF}"/>
-              </a:ext>
-            </a:extLst>
-          </p:cNvPr>
-          <p:cNvSpPr>
-            <a:spLocks noGrp="1"/>
-          </p:cNvSpPr>
-          <p:nvPr>
-            <p:ph type="subTitle" idx="1"/>
-          </p:nvPr>
-        </p:nvSpPr>
-        <p:spPr/>
-        <p:txBody>
-          <a:bodyPr/>
-          <a:lstStyle/>
-          <a:p>
-            <a:endParaRPr lang="en-US"/>
-          </a:p>
-        </p:txBody>
-      </p:sp>
-    </p:spTree>
-    <p:extLst>
-      <p:ext uri="{BB962C8B-B14F-4D97-AF65-F5344CB8AC3E}">
-        <p14:creationId xmlns:p14="http://schemas.microsoft.com/office/powerpoint/2010/main" val="2903526848"/>
-      </p:ext>
-    </p:extLst>
-  </p:cSld>
-  <p:clrMapOvr>
-    <a:masterClrMapping/>
-  </p:clrMapOvr>
-</p:sld>
-</file>
-
-<file path=ppt/slides/slide9.xml><?xml version="1.0" encoding="utf-8"?>
+<file path=ppt/slides/slide7.xml><?xml version="1.0" encoding="utf-8"?>
 <p:sld xmlns:a="http://schemas.openxmlformats.org/drawingml/2006/main" xmlns:r="http://schemas.openxmlformats.org/officeDocument/2006/relationships" xmlns:p="http://schemas.openxmlformats.org/presentationml/2006/main">
   <p:cSld>
     <p:spTree>
@@ -37492,6 +37037,249 @@
     <p:extLst>
       <p:ext uri="{BB962C8B-B14F-4D97-AF65-F5344CB8AC3E}">
         <p14:creationId xmlns:p14="http://schemas.microsoft.com/office/powerpoint/2010/main" val="3562301540"/>
+      </p:ext>
+    </p:extLst>
+  </p:cSld>
+  <p:clrMapOvr>
+    <a:masterClrMapping/>
+  </p:clrMapOvr>
+</p:sld>
+</file>
+
+<file path=ppt/slides/slide8.xml><?xml version="1.0" encoding="utf-8"?>
+<p:sld xmlns:a="http://schemas.openxmlformats.org/drawingml/2006/main" xmlns:r="http://schemas.openxmlformats.org/officeDocument/2006/relationships" xmlns:p="http://schemas.openxmlformats.org/presentationml/2006/main">
+  <p:cSld>
+    <p:spTree>
+      <p:nvGrpSpPr>
+        <p:cNvPr id="1" name=""/>
+        <p:cNvGrpSpPr/>
+        <p:nvPr/>
+      </p:nvGrpSpPr>
+      <p:grpSpPr>
+        <a:xfrm>
+          <a:off x="0" y="0"/>
+          <a:ext cx="0" cy="0"/>
+          <a:chOff x="0" y="0"/>
+          <a:chExt cx="0" cy="0"/>
+        </a:xfrm>
+      </p:grpSpPr>
+      <p:sp>
+        <p:nvSpPr>
+          <p:cNvPr id="2" name="Subtitle 1">
+            <a:extLst>
+              <a:ext uri="{FF2B5EF4-FFF2-40B4-BE49-F238E27FC236}">
+                <a16:creationId xmlns:a16="http://schemas.microsoft.com/office/drawing/2014/main" id="{B7AECF2B-E50F-A6A6-AADE-456F742CD3AE}"/>
+              </a:ext>
+            </a:extLst>
+          </p:cNvPr>
+          <p:cNvSpPr>
+            <a:spLocks noGrp="1"/>
+          </p:cNvSpPr>
+          <p:nvPr>
+            <p:ph type="subTitle" idx="1"/>
+          </p:nvPr>
+        </p:nvSpPr>
+        <p:spPr/>
+        <p:txBody>
+          <a:bodyPr/>
+          <a:lstStyle/>
+          <a:p>
+            <a:endParaRPr lang="en-US"/>
+          </a:p>
+        </p:txBody>
+      </p:sp>
+      <p:sp>
+        <p:nvSpPr>
+          <p:cNvPr id="3" name="Title 2">
+            <a:extLst>
+              <a:ext uri="{FF2B5EF4-FFF2-40B4-BE49-F238E27FC236}">
+                <a16:creationId xmlns:a16="http://schemas.microsoft.com/office/drawing/2014/main" id="{9E1D4F71-4885-3683-64D0-64BF6D3AC7AE}"/>
+              </a:ext>
+            </a:extLst>
+          </p:cNvPr>
+          <p:cNvSpPr>
+            <a:spLocks noGrp="1"/>
+          </p:cNvSpPr>
+          <p:nvPr>
+            <p:ph type="ctrTitle"/>
+          </p:nvPr>
+        </p:nvSpPr>
+        <p:spPr/>
+        <p:txBody>
+          <a:bodyPr/>
+          <a:lstStyle/>
+          <a:p>
+            <a:endParaRPr lang="en-US"/>
+          </a:p>
+        </p:txBody>
+      </p:sp>
+      <p:sp>
+        <p:nvSpPr>
+          <p:cNvPr id="4" name="Picture Placeholder 3">
+            <a:extLst>
+              <a:ext uri="{FF2B5EF4-FFF2-40B4-BE49-F238E27FC236}">
+                <a16:creationId xmlns:a16="http://schemas.microsoft.com/office/drawing/2014/main" id="{181CF957-9717-CF9C-DDCE-73E2B84B196B}"/>
+              </a:ext>
+            </a:extLst>
+          </p:cNvPr>
+          <p:cNvSpPr>
+            <a:spLocks noGrp="1"/>
+          </p:cNvSpPr>
+          <p:nvPr>
+            <p:ph type="pic" sz="quarter" idx="13"/>
+          </p:nvPr>
+        </p:nvSpPr>
+        <p:spPr/>
+        <p:txBody>
+          <a:bodyPr/>
+          <a:lstStyle/>
+          <a:p>
+            <a:endParaRPr lang="en-US"/>
+          </a:p>
+        </p:txBody>
+      </p:sp>
+      <p:sp>
+        <p:nvSpPr>
+          <p:cNvPr id="5" name="Picture Placeholder 4">
+            <a:extLst>
+              <a:ext uri="{FF2B5EF4-FFF2-40B4-BE49-F238E27FC236}">
+                <a16:creationId xmlns:a16="http://schemas.microsoft.com/office/drawing/2014/main" id="{2B01A400-0FCB-318B-954F-77575B0F60DD}"/>
+              </a:ext>
+            </a:extLst>
+          </p:cNvPr>
+          <p:cNvSpPr>
+            <a:spLocks noGrp="1"/>
+          </p:cNvSpPr>
+          <p:nvPr>
+            <p:ph type="pic" sz="quarter" idx="12"/>
+          </p:nvPr>
+        </p:nvSpPr>
+        <p:spPr/>
+        <p:txBody>
+          <a:bodyPr/>
+          <a:lstStyle/>
+          <a:p>
+            <a:endParaRPr lang="en-US"/>
+          </a:p>
+        </p:txBody>
+      </p:sp>
+      <p:sp>
+        <p:nvSpPr>
+          <p:cNvPr id="6" name="Picture Placeholder 5">
+            <a:extLst>
+              <a:ext uri="{FF2B5EF4-FFF2-40B4-BE49-F238E27FC236}">
+                <a16:creationId xmlns:a16="http://schemas.microsoft.com/office/drawing/2014/main" id="{2EEB064E-27A5-9F9D-B86F-3633B918516A}"/>
+              </a:ext>
+            </a:extLst>
+          </p:cNvPr>
+          <p:cNvSpPr>
+            <a:spLocks noGrp="1"/>
+          </p:cNvSpPr>
+          <p:nvPr>
+            <p:ph type="pic" sz="quarter" idx="14"/>
+          </p:nvPr>
+        </p:nvSpPr>
+        <p:spPr/>
+        <p:txBody>
+          <a:bodyPr/>
+          <a:lstStyle/>
+          <a:p>
+            <a:endParaRPr lang="en-US"/>
+          </a:p>
+        </p:txBody>
+      </p:sp>
+    </p:spTree>
+    <p:extLst>
+      <p:ext uri="{BB962C8B-B14F-4D97-AF65-F5344CB8AC3E}">
+        <p14:creationId xmlns:p14="http://schemas.microsoft.com/office/powerpoint/2010/main" val="276068639"/>
+      </p:ext>
+    </p:extLst>
+  </p:cSld>
+  <p:clrMapOvr>
+    <a:masterClrMapping/>
+  </p:clrMapOvr>
+</p:sld>
+</file>
+
+<file path=ppt/slides/slide9.xml><?xml version="1.0" encoding="utf-8"?>
+<p:sld xmlns:a="http://schemas.openxmlformats.org/drawingml/2006/main" xmlns:r="http://schemas.openxmlformats.org/officeDocument/2006/relationships" xmlns:p="http://schemas.openxmlformats.org/presentationml/2006/main">
+  <p:cSld>
+    <p:spTree>
+      <p:nvGrpSpPr>
+        <p:cNvPr id="1" name=""/>
+        <p:cNvGrpSpPr/>
+        <p:nvPr/>
+      </p:nvGrpSpPr>
+      <p:grpSpPr>
+        <a:xfrm>
+          <a:off x="0" y="0"/>
+          <a:ext cx="0" cy="0"/>
+          <a:chOff x="0" y="0"/>
+          <a:chExt cx="0" cy="0"/>
+        </a:xfrm>
+      </p:grpSpPr>
+      <p:sp>
+        <p:nvSpPr>
+          <p:cNvPr id="2" name="Title 1">
+            <a:extLst>
+              <a:ext uri="{FF2B5EF4-FFF2-40B4-BE49-F238E27FC236}">
+                <a16:creationId xmlns:a16="http://schemas.microsoft.com/office/drawing/2014/main" id="{6727981F-8DDB-4942-9095-1A301A93096A}"/>
+              </a:ext>
+            </a:extLst>
+          </p:cNvPr>
+          <p:cNvSpPr>
+            <a:spLocks noGrp="1"/>
+          </p:cNvSpPr>
+          <p:nvPr>
+            <p:ph type="ctrTitle"/>
+          </p:nvPr>
+        </p:nvSpPr>
+        <p:spPr/>
+        <p:txBody>
+          <a:bodyPr/>
+          <a:lstStyle/>
+          <a:p>
+            <a:r>
+              <a:rPr lang="vi-VN" dirty="0"/>
+              <a:t>THANK YOU VERY MUCH</a:t>
+            </a:r>
+            <a:endParaRPr lang="en-US" dirty="0"/>
+          </a:p>
+        </p:txBody>
+      </p:sp>
+      <p:sp>
+        <p:nvSpPr>
+          <p:cNvPr id="3" name="Subtitle 2">
+            <a:extLst>
+              <a:ext uri="{FF2B5EF4-FFF2-40B4-BE49-F238E27FC236}">
+                <a16:creationId xmlns:a16="http://schemas.microsoft.com/office/drawing/2014/main" id="{E3DE8CBC-CC0F-41DD-9762-03FD26D3B012}"/>
+              </a:ext>
+            </a:extLst>
+          </p:cNvPr>
+          <p:cNvSpPr>
+            <a:spLocks noGrp="1"/>
+          </p:cNvSpPr>
+          <p:nvPr>
+            <p:ph type="subTitle" idx="1"/>
+          </p:nvPr>
+        </p:nvSpPr>
+        <p:spPr/>
+        <p:txBody>
+          <a:bodyPr/>
+          <a:lstStyle/>
+          <a:p>
+            <a:r>
+              <a:rPr lang="vi-VN" dirty="0"/>
+              <a:t>Can Tho University</a:t>
+            </a:r>
+            <a:endParaRPr lang="en-US" dirty="0"/>
+          </a:p>
+        </p:txBody>
+      </p:sp>
+    </p:spTree>
+    <p:extLst>
+      <p:ext uri="{BB962C8B-B14F-4D97-AF65-F5344CB8AC3E}">
+        <p14:creationId xmlns:p14="http://schemas.microsoft.com/office/powerpoint/2010/main" val="131648227"/>
       </p:ext>
     </p:extLst>
   </p:cSld>

</xml_diff>